<commit_message>
Change in feature description
Specific feature description have been added to individual features of the web app .
</commit_message>
<xml_diff>
--- a/Documentation/Project Proposal/Group_3_project_proposal.pptx
+++ b/Documentation/Project Proposal/Group_3_project_proposal.pptx
@@ -6,13 +6,17 @@
   </p:sldMasterIdLst>
   <p:sldIdLst>
     <p:sldId id="257" r:id="rId2"/>
-    <p:sldId id="258" r:id="rId3"/>
-    <p:sldId id="259" r:id="rId4"/>
-    <p:sldId id="260" r:id="rId5"/>
-    <p:sldId id="261" r:id="rId6"/>
-    <p:sldId id="262" r:id="rId7"/>
-    <p:sldId id="263" r:id="rId8"/>
-    <p:sldId id="264" r:id="rId9"/>
+    <p:sldId id="265" r:id="rId3"/>
+    <p:sldId id="266" r:id="rId4"/>
+    <p:sldId id="267" r:id="rId5"/>
+    <p:sldId id="268" r:id="rId6"/>
+    <p:sldId id="258" r:id="rId7"/>
+    <p:sldId id="259" r:id="rId8"/>
+    <p:sldId id="260" r:id="rId9"/>
+    <p:sldId id="261" r:id="rId10"/>
+    <p:sldId id="262" r:id="rId11"/>
+    <p:sldId id="263" r:id="rId12"/>
+    <p:sldId id="264" r:id="rId13"/>
   </p:sldIdLst>
   <p:sldSz cx="9144000" cy="6858000" type="screen4x3"/>
   <p:notesSz cx="6858000" cy="9144000"/>
@@ -309,7 +313,7 @@
                 </a:solidFill>
               </a:rPr>
               <a:pPr/>
-              <a:t>2/13/2019</a:t>
+              <a:t>2/23/2019</a:t>
             </a:fld>
             <a:endParaRPr lang="en-US" dirty="0">
               <a:solidFill>
@@ -460,7 +464,7 @@
     </p:spTree>
     <p:extLst>
       <p:ext uri="{BB962C8B-B14F-4D97-AF65-F5344CB8AC3E}">
-        <p14:creationId xmlns:p14="http://schemas.microsoft.com/office/powerpoint/2010/main" val="3997316792"/>
+        <p14:creationId xmlns:p14="http://schemas.microsoft.com/office/powerpoint/2010/main" xmlns="" val="3997316792"/>
       </p:ext>
     </p:extLst>
   </p:cSld>
@@ -667,7 +671,7 @@
                 </a:solidFill>
               </a:rPr>
               <a:pPr/>
-              <a:t>2/13/2019</a:t>
+              <a:t>2/23/2019</a:t>
             </a:fld>
             <a:endParaRPr lang="en-US" dirty="0">
               <a:solidFill>
@@ -818,7 +822,7 @@
     </p:spTree>
     <p:extLst>
       <p:ext uri="{BB962C8B-B14F-4D97-AF65-F5344CB8AC3E}">
-        <p14:creationId xmlns:p14="http://schemas.microsoft.com/office/powerpoint/2010/main" val="2923600152"/>
+        <p14:creationId xmlns:p14="http://schemas.microsoft.com/office/powerpoint/2010/main" xmlns="" val="2923600152"/>
       </p:ext>
     </p:extLst>
   </p:cSld>
@@ -1088,7 +1092,7 @@
                 </a:solidFill>
               </a:rPr>
               <a:pPr/>
-              <a:t>2/13/2019</a:t>
+              <a:t>2/23/2019</a:t>
             </a:fld>
             <a:endParaRPr lang="en-US" dirty="0">
               <a:solidFill>
@@ -1313,7 +1317,7 @@
     </p:spTree>
     <p:extLst>
       <p:ext uri="{BB962C8B-B14F-4D97-AF65-F5344CB8AC3E}">
-        <p14:creationId xmlns:p14="http://schemas.microsoft.com/office/powerpoint/2010/main" val="4204934164"/>
+        <p14:creationId xmlns:p14="http://schemas.microsoft.com/office/powerpoint/2010/main" xmlns="" val="4204934164"/>
       </p:ext>
     </p:extLst>
   </p:cSld>
@@ -1442,7 +1446,7 @@
                 </a:solidFill>
               </a:rPr>
               <a:pPr/>
-              <a:t>2/13/2019</a:t>
+              <a:t>2/23/2019</a:t>
             </a:fld>
             <a:endParaRPr lang="en-US" dirty="0">
               <a:solidFill>
@@ -1593,7 +1597,7 @@
     </p:spTree>
     <p:extLst>
       <p:ext uri="{BB962C8B-B14F-4D97-AF65-F5344CB8AC3E}">
-        <p14:creationId xmlns:p14="http://schemas.microsoft.com/office/powerpoint/2010/main" val="525972120"/>
+        <p14:creationId xmlns:p14="http://schemas.microsoft.com/office/powerpoint/2010/main" xmlns="" val="525972120"/>
       </p:ext>
     </p:extLst>
   </p:cSld>
@@ -1782,7 +1786,7 @@
                 </a:solidFill>
               </a:rPr>
               <a:pPr/>
-              <a:t>2/13/2019</a:t>
+              <a:t>2/23/2019</a:t>
             </a:fld>
             <a:endParaRPr lang="en-US" dirty="0">
               <a:solidFill>
@@ -2007,7 +2011,7 @@
     </p:spTree>
     <p:extLst>
       <p:ext uri="{BB962C8B-B14F-4D97-AF65-F5344CB8AC3E}">
-        <p14:creationId xmlns:p14="http://schemas.microsoft.com/office/powerpoint/2010/main" val="1364715439"/>
+        <p14:creationId xmlns:p14="http://schemas.microsoft.com/office/powerpoint/2010/main" xmlns="" val="1364715439"/>
       </p:ext>
     </p:extLst>
   </p:cSld>
@@ -2196,7 +2200,7 @@
                 </a:solidFill>
               </a:rPr>
               <a:pPr/>
-              <a:t>2/13/2019</a:t>
+              <a:t>2/23/2019</a:t>
             </a:fld>
             <a:endParaRPr lang="en-US" dirty="0">
               <a:solidFill>
@@ -2347,7 +2351,7 @@
     </p:spTree>
     <p:extLst>
       <p:ext uri="{BB962C8B-B14F-4D97-AF65-F5344CB8AC3E}">
-        <p14:creationId xmlns:p14="http://schemas.microsoft.com/office/powerpoint/2010/main" val="3606409602"/>
+        <p14:creationId xmlns:p14="http://schemas.microsoft.com/office/powerpoint/2010/main" xmlns="" val="3606409602"/>
       </p:ext>
     </p:extLst>
   </p:cSld>
@@ -2473,7 +2477,7 @@
                 </a:solidFill>
               </a:rPr>
               <a:pPr/>
-              <a:t>2/13/2019</a:t>
+              <a:t>2/23/2019</a:t>
             </a:fld>
             <a:endParaRPr lang="en-US" dirty="0">
               <a:solidFill>
@@ -2619,7 +2623,7 @@
     </p:spTree>
     <p:extLst>
       <p:ext uri="{BB962C8B-B14F-4D97-AF65-F5344CB8AC3E}">
-        <p14:creationId xmlns:p14="http://schemas.microsoft.com/office/powerpoint/2010/main" val="1419491675"/>
+        <p14:creationId xmlns:p14="http://schemas.microsoft.com/office/powerpoint/2010/main" xmlns="" val="1419491675"/>
       </p:ext>
     </p:extLst>
   </p:cSld>
@@ -2755,7 +2759,7 @@
                 </a:solidFill>
               </a:rPr>
               <a:pPr/>
-              <a:t>2/13/2019</a:t>
+              <a:t>2/23/2019</a:t>
             </a:fld>
             <a:endParaRPr lang="en-US" dirty="0">
               <a:solidFill>
@@ -2901,7 +2905,7 @@
     </p:spTree>
     <p:extLst>
       <p:ext uri="{BB962C8B-B14F-4D97-AF65-F5344CB8AC3E}">
-        <p14:creationId xmlns:p14="http://schemas.microsoft.com/office/powerpoint/2010/main" val="2615026831"/>
+        <p14:creationId xmlns:p14="http://schemas.microsoft.com/office/powerpoint/2010/main" xmlns="" val="2615026831"/>
       </p:ext>
     </p:extLst>
   </p:cSld>
@@ -3037,7 +3041,7 @@
                 </a:solidFill>
               </a:rPr>
               <a:pPr/>
-              <a:t>2/13/2019</a:t>
+              <a:t>2/23/2019</a:t>
             </a:fld>
             <a:endParaRPr lang="en-US" dirty="0">
               <a:solidFill>
@@ -3183,7 +3187,7 @@
     </p:spTree>
     <p:extLst>
       <p:ext uri="{BB962C8B-B14F-4D97-AF65-F5344CB8AC3E}">
-        <p14:creationId xmlns:p14="http://schemas.microsoft.com/office/powerpoint/2010/main" val="1481853877"/>
+        <p14:creationId xmlns:p14="http://schemas.microsoft.com/office/powerpoint/2010/main" xmlns="" val="1481853877"/>
       </p:ext>
     </p:extLst>
   </p:cSld>
@@ -3386,7 +3390,7 @@
                 </a:solidFill>
               </a:rPr>
               <a:pPr/>
-              <a:t>2/13/2019</a:t>
+              <a:t>2/23/2019</a:t>
             </a:fld>
             <a:endParaRPr lang="en-US" dirty="0">
               <a:solidFill>
@@ -3537,7 +3541,7 @@
     </p:spTree>
     <p:extLst>
       <p:ext uri="{BB962C8B-B14F-4D97-AF65-F5344CB8AC3E}">
-        <p14:creationId xmlns:p14="http://schemas.microsoft.com/office/powerpoint/2010/main" val="430348826"/>
+        <p14:creationId xmlns:p14="http://schemas.microsoft.com/office/powerpoint/2010/main" xmlns="" val="430348826"/>
       </p:ext>
     </p:extLst>
   </p:cSld>
@@ -3729,7 +3733,7 @@
                 </a:solidFill>
               </a:rPr>
               <a:pPr/>
-              <a:t>2/13/2019</a:t>
+              <a:t>2/23/2019</a:t>
             </a:fld>
             <a:endParaRPr lang="en-US" dirty="0">
               <a:solidFill>
@@ -3880,7 +3884,7 @@
     </p:spTree>
     <p:extLst>
       <p:ext uri="{BB962C8B-B14F-4D97-AF65-F5344CB8AC3E}">
-        <p14:creationId xmlns:p14="http://schemas.microsoft.com/office/powerpoint/2010/main" val="4159634982"/>
+        <p14:creationId xmlns:p14="http://schemas.microsoft.com/office/powerpoint/2010/main" xmlns="" val="4159634982"/>
       </p:ext>
     </p:extLst>
   </p:cSld>
@@ -4206,7 +4210,7 @@
                 </a:solidFill>
               </a:rPr>
               <a:pPr/>
-              <a:t>2/13/2019</a:t>
+              <a:t>2/23/2019</a:t>
             </a:fld>
             <a:endParaRPr lang="en-US" dirty="0">
               <a:solidFill>
@@ -4357,7 +4361,7 @@
     </p:spTree>
     <p:extLst>
       <p:ext uri="{BB962C8B-B14F-4D97-AF65-F5344CB8AC3E}">
-        <p14:creationId xmlns:p14="http://schemas.microsoft.com/office/powerpoint/2010/main" val="828935280"/>
+        <p14:creationId xmlns:p14="http://schemas.microsoft.com/office/powerpoint/2010/main" xmlns="" val="828935280"/>
       </p:ext>
     </p:extLst>
   </p:cSld>
@@ -4431,7 +4435,7 @@
                 </a:solidFill>
               </a:rPr>
               <a:pPr/>
-              <a:t>2/13/2019</a:t>
+              <a:t>2/23/2019</a:t>
             </a:fld>
             <a:endParaRPr lang="en-US" dirty="0">
               <a:solidFill>
@@ -4577,7 +4581,7 @@
     </p:spTree>
     <p:extLst>
       <p:ext uri="{BB962C8B-B14F-4D97-AF65-F5344CB8AC3E}">
-        <p14:creationId xmlns:p14="http://schemas.microsoft.com/office/powerpoint/2010/main" val="3901826861"/>
+        <p14:creationId xmlns:p14="http://schemas.microsoft.com/office/powerpoint/2010/main" xmlns="" val="3901826861"/>
       </p:ext>
     </p:extLst>
   </p:cSld>
@@ -4628,7 +4632,7 @@
                 </a:solidFill>
               </a:rPr>
               <a:pPr/>
-              <a:t>2/13/2019</a:t>
+              <a:t>2/23/2019</a:t>
             </a:fld>
             <a:endParaRPr lang="en-US" dirty="0">
               <a:solidFill>
@@ -4774,7 +4778,7 @@
     </p:spTree>
     <p:extLst>
       <p:ext uri="{BB962C8B-B14F-4D97-AF65-F5344CB8AC3E}">
-        <p14:creationId xmlns:p14="http://schemas.microsoft.com/office/powerpoint/2010/main" val="3718309961"/>
+        <p14:creationId xmlns:p14="http://schemas.microsoft.com/office/powerpoint/2010/main" xmlns="" val="3718309961"/>
       </p:ext>
     </p:extLst>
   </p:cSld>
@@ -4981,7 +4985,7 @@
                 </a:solidFill>
               </a:rPr>
               <a:pPr/>
-              <a:t>2/13/2019</a:t>
+              <a:t>2/23/2019</a:t>
             </a:fld>
             <a:endParaRPr lang="en-US" dirty="0">
               <a:solidFill>
@@ -5127,7 +5131,7 @@
     </p:spTree>
     <p:extLst>
       <p:ext uri="{BB962C8B-B14F-4D97-AF65-F5344CB8AC3E}">
-        <p14:creationId xmlns:p14="http://schemas.microsoft.com/office/powerpoint/2010/main" val="1050642606"/>
+        <p14:creationId xmlns:p14="http://schemas.microsoft.com/office/powerpoint/2010/main" xmlns="" val="1050642606"/>
       </p:ext>
     </p:extLst>
   </p:cSld>
@@ -5346,7 +5350,7 @@
                 </a:solidFill>
               </a:rPr>
               <a:pPr/>
-              <a:t>2/13/2019</a:t>
+              <a:t>2/23/2019</a:t>
             </a:fld>
             <a:endParaRPr lang="en-US" dirty="0">
               <a:solidFill>
@@ -5497,7 +5501,7 @@
     </p:spTree>
     <p:extLst>
       <p:ext uri="{BB962C8B-B14F-4D97-AF65-F5344CB8AC3E}">
-        <p14:creationId xmlns:p14="http://schemas.microsoft.com/office/powerpoint/2010/main" val="2692846483"/>
+        <p14:creationId xmlns:p14="http://schemas.microsoft.com/office/powerpoint/2010/main" xmlns="" val="2692846483"/>
       </p:ext>
     </p:extLst>
   </p:cSld>
@@ -7484,7 +7488,7 @@
                 </a:solidFill>
               </a:rPr>
               <a:pPr defTabSz="457200"/>
-              <a:t>2/13/2019</a:t>
+              <a:t>2/23/2019</a:t>
             </a:fld>
             <a:endParaRPr lang="en-US" dirty="0">
               <a:solidFill>
@@ -7584,7 +7588,7 @@
     </p:spTree>
     <p:extLst>
       <p:ext uri="{BB962C8B-B14F-4D97-AF65-F5344CB8AC3E}">
-        <p14:creationId xmlns:p14="http://schemas.microsoft.com/office/powerpoint/2010/main" val="2855505730"/>
+        <p14:creationId xmlns:p14="http://schemas.microsoft.com/office/powerpoint/2010/main" xmlns="" val="2855505730"/>
       </p:ext>
     </p:extLst>
   </p:cSld>
@@ -8085,7 +8089,352 @@
     </p:spTree>
     <p:extLst>
       <p:ext uri="{BB962C8B-B14F-4D97-AF65-F5344CB8AC3E}">
-        <p14:creationId xmlns:p14="http://schemas.microsoft.com/office/powerpoint/2010/main" val="3994539476"/>
+        <p14:creationId xmlns:p14="http://schemas.microsoft.com/office/powerpoint/2010/main" xmlns="" val="3994539476"/>
+      </p:ext>
+    </p:extLst>
+  </p:cSld>
+  <p:clrMapOvr>
+    <a:masterClrMapping/>
+  </p:clrMapOvr>
+</p:sld>
+</file>
+
+<file path=ppt/slides/slide10.xml><?xml version="1.0" encoding="utf-8"?>
+<p:sld xmlns:a="http://schemas.openxmlformats.org/drawingml/2006/main" xmlns:r="http://schemas.openxmlformats.org/officeDocument/2006/relationships" xmlns:p="http://schemas.openxmlformats.org/presentationml/2006/main">
+  <p:cSld>
+    <p:spTree>
+      <p:nvGrpSpPr>
+        <p:cNvPr id="1" name=""/>
+        <p:cNvGrpSpPr/>
+        <p:nvPr/>
+      </p:nvGrpSpPr>
+      <p:grpSpPr>
+        <a:xfrm>
+          <a:off x="0" y="0"/>
+          <a:ext cx="0" cy="0"/>
+          <a:chOff x="0" y="0"/>
+          <a:chExt cx="0" cy="0"/>
+        </a:xfrm>
+      </p:grpSpPr>
+      <p:sp>
+        <p:nvSpPr>
+          <p:cNvPr id="2" name="Title 1"/>
+          <p:cNvSpPr>
+            <a:spLocks noGrp="1"/>
+          </p:cNvSpPr>
+          <p:nvPr>
+            <p:ph type="title"/>
+          </p:nvPr>
+        </p:nvSpPr>
+        <p:spPr/>
+        <p:txBody>
+          <a:bodyPr/>
+          <a:lstStyle/>
+          <a:p>
+            <a:r>
+              <a:rPr lang="en-US" dirty="0" smtClean="0"/>
+              <a:t>Real Life achievements </a:t>
+            </a:r>
+            <a:endParaRPr lang="en-US" dirty="0"/>
+          </a:p>
+        </p:txBody>
+      </p:sp>
+      <p:sp>
+        <p:nvSpPr>
+          <p:cNvPr id="3" name="Content Placeholder 2"/>
+          <p:cNvSpPr>
+            <a:spLocks noGrp="1"/>
+          </p:cNvSpPr>
+          <p:nvPr>
+            <p:ph idx="1"/>
+          </p:nvPr>
+        </p:nvSpPr>
+        <p:spPr/>
+        <p:txBody>
+          <a:bodyPr>
+            <a:normAutofit/>
+          </a:bodyPr>
+          <a:lstStyle/>
+          <a:p>
+            <a:r>
+              <a:rPr lang="en-US" sz="2400" dirty="0" smtClean="0"/>
+              <a:t>People will get their desired jobs by sitting at home</a:t>
+            </a:r>
+          </a:p>
+          <a:p>
+            <a:r>
+              <a:rPr lang="en-US" sz="2400" dirty="0" smtClean="0"/>
+              <a:t>We can earn money by running adds </a:t>
+            </a:r>
+          </a:p>
+          <a:p>
+            <a:r>
+              <a:rPr lang="en-US" sz="2400" dirty="0" smtClean="0"/>
+              <a:t>will decrease the unemployment rate</a:t>
+            </a:r>
+          </a:p>
+          <a:p>
+            <a:endParaRPr lang="en-US" sz="2400" dirty="0" smtClean="0"/>
+          </a:p>
+          <a:p>
+            <a:endParaRPr lang="en-US" sz="2400" dirty="0"/>
+          </a:p>
+        </p:txBody>
+      </p:sp>
+    </p:spTree>
+    <p:extLst>
+      <p:ext uri="{BB962C8B-B14F-4D97-AF65-F5344CB8AC3E}">
+        <p14:creationId xmlns:p14="http://schemas.microsoft.com/office/powerpoint/2010/main" xmlns="" val="3306693991"/>
+      </p:ext>
+    </p:extLst>
+  </p:cSld>
+  <p:clrMapOvr>
+    <a:masterClrMapping/>
+  </p:clrMapOvr>
+</p:sld>
+</file>
+
+<file path=ppt/slides/slide11.xml><?xml version="1.0" encoding="utf-8"?>
+<p:sld xmlns:a="http://schemas.openxmlformats.org/drawingml/2006/main" xmlns:r="http://schemas.openxmlformats.org/officeDocument/2006/relationships" xmlns:p="http://schemas.openxmlformats.org/presentationml/2006/main">
+  <p:cSld>
+    <p:spTree>
+      <p:nvGrpSpPr>
+        <p:cNvPr id="1" name=""/>
+        <p:cNvGrpSpPr/>
+        <p:nvPr/>
+      </p:nvGrpSpPr>
+      <p:grpSpPr>
+        <a:xfrm>
+          <a:off x="0" y="0"/>
+          <a:ext cx="0" cy="0"/>
+          <a:chOff x="0" y="0"/>
+          <a:chExt cx="0" cy="0"/>
+        </a:xfrm>
+      </p:grpSpPr>
+      <p:sp>
+        <p:nvSpPr>
+          <p:cNvPr id="2" name="Title 1"/>
+          <p:cNvSpPr>
+            <a:spLocks noGrp="1"/>
+          </p:cNvSpPr>
+          <p:nvPr>
+            <p:ph type="title"/>
+          </p:nvPr>
+        </p:nvSpPr>
+        <p:spPr/>
+        <p:txBody>
+          <a:bodyPr/>
+          <a:lstStyle/>
+          <a:p>
+            <a:r>
+              <a:rPr lang="en-US" dirty="0" smtClean="0"/>
+              <a:t>Technology Used</a:t>
+            </a:r>
+            <a:endParaRPr lang="en-US" dirty="0"/>
+          </a:p>
+        </p:txBody>
+      </p:sp>
+      <p:sp>
+        <p:nvSpPr>
+          <p:cNvPr id="3" name="Content Placeholder 2"/>
+          <p:cNvSpPr>
+            <a:spLocks noGrp="1"/>
+          </p:cNvSpPr>
+          <p:nvPr>
+            <p:ph idx="1"/>
+          </p:nvPr>
+        </p:nvSpPr>
+        <p:spPr/>
+        <p:txBody>
+          <a:bodyPr>
+            <a:normAutofit/>
+          </a:bodyPr>
+          <a:lstStyle/>
+          <a:p>
+            <a:pPr marL="0" indent="0">
+              <a:buNone/>
+            </a:pPr>
+            <a:r>
+              <a:rPr lang="en-US" sz="2800" dirty="0" smtClean="0"/>
+              <a:t>  </a:t>
+            </a:r>
+            <a:r>
+              <a:rPr lang="en-US" sz="2800" b="1" dirty="0" smtClean="0"/>
+              <a:t>Backend :</a:t>
+            </a:r>
+          </a:p>
+          <a:p>
+            <a:pPr marL="0" indent="0">
+              <a:buNone/>
+            </a:pPr>
+            <a:endParaRPr lang="en-US" sz="2800" b="1" dirty="0" smtClean="0"/>
+          </a:p>
+          <a:p>
+            <a:pPr marL="0" indent="0">
+              <a:buNone/>
+            </a:pPr>
+            <a:r>
+              <a:rPr lang="en-US" sz="2800" b="1" dirty="0" smtClean="0"/>
+              <a:t>Framework - </a:t>
+            </a:r>
+            <a:r>
+              <a:rPr lang="en-US" sz="2800" b="1" dirty="0" err="1" smtClean="0"/>
+              <a:t>Laravel</a:t>
+            </a:r>
+            <a:endParaRPr lang="en-US" sz="2800" b="1" dirty="0" smtClean="0"/>
+          </a:p>
+          <a:p>
+            <a:pPr marL="0" indent="0">
+              <a:buNone/>
+            </a:pPr>
+            <a:r>
+              <a:rPr lang="en-US" sz="2800" b="1" dirty="0" smtClean="0"/>
+              <a:t>Language - PHP</a:t>
+            </a:r>
+          </a:p>
+          <a:p>
+            <a:pPr marL="0" indent="0">
+              <a:buNone/>
+            </a:pPr>
+            <a:r>
+              <a:rPr lang="en-US" sz="2800" b="1" dirty="0" smtClean="0"/>
+              <a:t>Database - MySQL</a:t>
+            </a:r>
+            <a:endParaRPr lang="en-US" sz="2800" b="1" dirty="0"/>
+          </a:p>
+        </p:txBody>
+      </p:sp>
+    </p:spTree>
+    <p:extLst>
+      <p:ext uri="{BB962C8B-B14F-4D97-AF65-F5344CB8AC3E}">
+        <p14:creationId xmlns:p14="http://schemas.microsoft.com/office/powerpoint/2010/main" xmlns="" val="1830609776"/>
+      </p:ext>
+    </p:extLst>
+  </p:cSld>
+  <p:clrMapOvr>
+    <a:masterClrMapping/>
+  </p:clrMapOvr>
+</p:sld>
+</file>
+
+<file path=ppt/slides/slide12.xml><?xml version="1.0" encoding="utf-8"?>
+<p:sld xmlns:a="http://schemas.openxmlformats.org/drawingml/2006/main" xmlns:r="http://schemas.openxmlformats.org/officeDocument/2006/relationships" xmlns:p="http://schemas.openxmlformats.org/presentationml/2006/main">
+  <p:cSld>
+    <p:spTree>
+      <p:nvGrpSpPr>
+        <p:cNvPr id="1" name=""/>
+        <p:cNvGrpSpPr/>
+        <p:nvPr/>
+      </p:nvGrpSpPr>
+      <p:grpSpPr>
+        <a:xfrm>
+          <a:off x="0" y="0"/>
+          <a:ext cx="0" cy="0"/>
+          <a:chOff x="0" y="0"/>
+          <a:chExt cx="0" cy="0"/>
+        </a:xfrm>
+      </p:grpSpPr>
+      <p:sp>
+        <p:nvSpPr>
+          <p:cNvPr id="2" name="Title 1"/>
+          <p:cNvSpPr>
+            <a:spLocks noGrp="1"/>
+          </p:cNvSpPr>
+          <p:nvPr>
+            <p:ph type="title"/>
+          </p:nvPr>
+        </p:nvSpPr>
+        <p:spPr/>
+        <p:txBody>
+          <a:bodyPr/>
+          <a:lstStyle/>
+          <a:p>
+            <a:r>
+              <a:rPr lang="en-US" dirty="0"/>
+              <a:t>Technology Used</a:t>
+            </a:r>
+          </a:p>
+        </p:txBody>
+      </p:sp>
+      <p:sp>
+        <p:nvSpPr>
+          <p:cNvPr id="3" name="Content Placeholder 2"/>
+          <p:cNvSpPr>
+            <a:spLocks noGrp="1"/>
+          </p:cNvSpPr>
+          <p:nvPr>
+            <p:ph idx="1"/>
+          </p:nvPr>
+        </p:nvSpPr>
+        <p:spPr/>
+        <p:txBody>
+          <a:bodyPr>
+            <a:normAutofit/>
+          </a:bodyPr>
+          <a:lstStyle/>
+          <a:p>
+            <a:pPr marL="0" indent="0">
+              <a:buNone/>
+            </a:pPr>
+            <a:r>
+              <a:rPr lang="en-US" sz="2800" dirty="0"/>
+              <a:t> </a:t>
+            </a:r>
+            <a:r>
+              <a:rPr lang="en-US" sz="2800" dirty="0" smtClean="0"/>
+              <a:t>  </a:t>
+            </a:r>
+            <a:r>
+              <a:rPr lang="en-US" sz="2800" b="1" dirty="0" smtClean="0"/>
+              <a:t>Front End:</a:t>
+            </a:r>
+          </a:p>
+          <a:p>
+            <a:pPr marL="0" indent="0">
+              <a:buNone/>
+            </a:pPr>
+            <a:endParaRPr lang="en-US" sz="2800" b="1" dirty="0"/>
+          </a:p>
+          <a:p>
+            <a:pPr marL="0" indent="0">
+              <a:buNone/>
+            </a:pPr>
+            <a:r>
+              <a:rPr lang="en-US" sz="2800" b="1" dirty="0" smtClean="0"/>
+              <a:t>Framework </a:t>
+            </a:r>
+            <a:r>
+              <a:rPr lang="mr-IN" sz="2800" b="1" dirty="0" smtClean="0"/>
+              <a:t>–</a:t>
+            </a:r>
+            <a:r>
+              <a:rPr lang="en-US" sz="2800" b="1" dirty="0" smtClean="0"/>
+              <a:t> Bootstrap</a:t>
+            </a:r>
+          </a:p>
+          <a:p>
+            <a:pPr marL="0" indent="0">
+              <a:buNone/>
+            </a:pPr>
+            <a:r>
+              <a:rPr lang="en-US" sz="2800" b="1" dirty="0" smtClean="0"/>
+              <a:t>Language </a:t>
+            </a:r>
+            <a:r>
+              <a:rPr lang="mr-IN" sz="2800" b="1" dirty="0" smtClean="0"/>
+              <a:t>–</a:t>
+            </a:r>
+            <a:r>
+              <a:rPr lang="en-US" sz="2800" b="1" dirty="0" smtClean="0"/>
+              <a:t> JavaScript ,CSS</a:t>
+            </a:r>
+          </a:p>
+        </p:txBody>
+      </p:sp>
+    </p:spTree>
+    <p:extLst>
+      <p:ext uri="{BB962C8B-B14F-4D97-AF65-F5344CB8AC3E}">
+        <p14:creationId xmlns:p14="http://schemas.microsoft.com/office/powerpoint/2010/main" xmlns="" val="3631553748"/>
       </p:ext>
     </p:extLst>
   </p:cSld>
@@ -8129,7 +8478,7 @@
           <a:p>
             <a:r>
               <a:rPr lang="en-US" dirty="0" smtClean="0"/>
-              <a:t>Description</a:t>
+              <a:t>Home</a:t>
             </a:r>
             <a:endParaRPr lang="en-US" dirty="0"/>
           </a:p>
@@ -8147,37 +8496,88 @@
         </p:nvSpPr>
         <p:spPr/>
         <p:txBody>
-          <a:bodyPr>
-            <a:normAutofit/>
-          </a:bodyPr>
+          <a:bodyPr/>
           <a:lstStyle/>
           <a:p>
             <a:r>
-              <a:rPr lang="en-US" sz="2400" dirty="0" smtClean="0"/>
-              <a:t>It will be an online based website where people can browse through the newsfeed to look into their desired jobs.</a:t>
-            </a:r>
-          </a:p>
-          <a:p>
-            <a:r>
-              <a:rPr lang="en-US" sz="2400" dirty="0" smtClean="0"/>
-              <a:t>We will try to connect all the companies so that there will be a variety types of jobs available.</a:t>
-            </a:r>
-          </a:p>
-          <a:p>
-            <a:r>
-              <a:rPr lang="en-US" sz="2400" dirty="0" smtClean="0"/>
-              <a:t>It will offer jobs like IT , Corporate , Teaching and other variety jobs in private sectors.</a:t>
-            </a:r>
-            <a:endParaRPr lang="en-US" sz="2400" dirty="0"/>
+              <a:rPr lang="en-US" dirty="0" smtClean="0"/>
+              <a:t>Sign up:	</a:t>
+            </a:r>
+          </a:p>
+          <a:p>
+            <a:pPr lvl="3">
+              <a:buNone/>
+            </a:pPr>
+            <a:r>
+              <a:rPr lang="en-US" dirty="0" smtClean="0"/>
+              <a:t>Candidates  needs email address and password to register.</a:t>
+            </a:r>
+          </a:p>
+          <a:p>
+            <a:pPr lvl="3">
+              <a:buNone/>
+            </a:pPr>
+            <a:r>
+              <a:rPr lang="en-US" dirty="0" smtClean="0"/>
+              <a:t>Specific Job boards also need to register to post job vacancy.</a:t>
+            </a:r>
+          </a:p>
+          <a:p>
+            <a:pPr>
+              <a:buNone/>
+            </a:pPr>
+            <a:r>
+              <a:rPr lang="en-US" dirty="0" smtClean="0"/>
+              <a:t> </a:t>
+            </a:r>
+          </a:p>
+          <a:p>
+            <a:r>
+              <a:rPr lang="en-US" dirty="0" smtClean="0"/>
+              <a:t>Sign in:  </a:t>
+            </a:r>
+          </a:p>
+          <a:p>
+            <a:pPr lvl="2">
+              <a:buNone/>
+            </a:pPr>
+            <a:r>
+              <a:rPr lang="en-US" dirty="0" smtClean="0"/>
+              <a:t>	</a:t>
+            </a:r>
+            <a:r>
+              <a:rPr lang="en-US" dirty="0" smtClean="0"/>
+              <a:t>Whenever a candidate or job board sign in with username and password  they will be redirected to the corresponding home page.</a:t>
+            </a:r>
+          </a:p>
+          <a:p>
+            <a:r>
+              <a:rPr lang="en-US" dirty="0" smtClean="0"/>
+              <a:t>FAQ:</a:t>
+            </a:r>
+          </a:p>
+          <a:p>
+            <a:pPr>
+              <a:buNone/>
+            </a:pPr>
+            <a:r>
+              <a:rPr lang="en-US" dirty="0" smtClean="0"/>
+              <a:t>	</a:t>
+            </a:r>
+            <a:r>
+              <a:rPr lang="en-US" dirty="0" smtClean="0"/>
+              <a:t>		It will contain generally asked question about how to sign in/ sign up, upload, download.</a:t>
+            </a:r>
+          </a:p>
+          <a:p>
+            <a:pPr lvl="3">
+              <a:buNone/>
+            </a:pPr>
+            <a:endParaRPr lang="en-US" dirty="0" smtClean="0"/>
           </a:p>
         </p:txBody>
       </p:sp>
     </p:spTree>
-    <p:extLst>
-      <p:ext uri="{BB962C8B-B14F-4D97-AF65-F5344CB8AC3E}">
-        <p14:creationId xmlns:p14="http://schemas.microsoft.com/office/powerpoint/2010/main" val="2162233371"/>
-      </p:ext>
-    </p:extLst>
   </p:cSld>
   <p:clrMapOvr>
     <a:masterClrMapping/>
@@ -8219,7 +8619,7 @@
           <a:p>
             <a:r>
               <a:rPr lang="en-US" dirty="0" smtClean="0"/>
-              <a:t>Problem Faced</a:t>
+              <a:t>Account Profile</a:t>
             </a:r>
             <a:endParaRPr lang="en-US" dirty="0"/>
           </a:p>
@@ -8237,59 +8637,57 @@
         </p:nvSpPr>
         <p:spPr/>
         <p:txBody>
-          <a:bodyPr>
-            <a:normAutofit fontScale="92500"/>
-          </a:bodyPr>
+          <a:bodyPr/>
           <a:lstStyle/>
           <a:p>
             <a:r>
-              <a:rPr lang="en-US" sz="2400" dirty="0" smtClean="0"/>
-              <a:t>Finding a job is one of the biggest problem</a:t>
-            </a:r>
-          </a:p>
-          <a:p>
-            <a:r>
-              <a:rPr lang="en-US" sz="2400" dirty="0" smtClean="0"/>
-              <a:t>Unemployment rate is increasing day by day</a:t>
-            </a:r>
-          </a:p>
-          <a:p>
-            <a:r>
-              <a:rPr lang="en-US" sz="2400" dirty="0" smtClean="0"/>
-              <a:t>There is very few online job websites in our country</a:t>
-            </a:r>
-          </a:p>
-          <a:p>
-            <a:r>
-              <a:rPr lang="en-US" sz="2400" dirty="0" smtClean="0"/>
-              <a:t>Other websites also don</a:t>
-            </a:r>
-            <a:r>
-              <a:rPr lang="mr-IN" sz="2400" dirty="0" smtClean="0"/>
-              <a:t>’</a:t>
-            </a:r>
-            <a:r>
-              <a:rPr lang="en-US" sz="2400" dirty="0" smtClean="0"/>
-              <a:t>t work well. Noticeable bugs in them . No one to fix</a:t>
-            </a:r>
-          </a:p>
-          <a:p>
-            <a:r>
-              <a:rPr lang="en-US" sz="2400" dirty="0" smtClean="0"/>
-              <a:t>Complex user interface(UI) for mass people.</a:t>
-            </a:r>
-          </a:p>
-          <a:p>
-            <a:endParaRPr lang="en-US" sz="2400" dirty="0"/>
+              <a:rPr lang="en-US" dirty="0" smtClean="0"/>
+              <a:t>Candidate Profile: </a:t>
+            </a:r>
+          </a:p>
+          <a:p>
+            <a:pPr>
+              <a:buNone/>
+            </a:pPr>
+            <a:r>
+              <a:rPr lang="en-US" dirty="0" smtClean="0"/>
+              <a:t>	</a:t>
+            </a:r>
+            <a:r>
+              <a:rPr lang="en-US" dirty="0" smtClean="0"/>
+              <a:t>					</a:t>
+            </a:r>
+            <a:r>
+              <a:rPr lang="en-US" dirty="0" smtClean="0"/>
+              <a:t> This will contain sufficient information about the </a:t>
+            </a:r>
+            <a:r>
+              <a:rPr lang="en-US" dirty="0" smtClean="0"/>
+              <a:t>candidate.</a:t>
+            </a:r>
+          </a:p>
+          <a:p>
+            <a:r>
+              <a:rPr lang="en-US" dirty="0" smtClean="0"/>
+              <a:t>Job Board Profile:</a:t>
+            </a:r>
+          </a:p>
+          <a:p>
+            <a:pPr>
+              <a:buNone/>
+            </a:pPr>
+            <a:r>
+              <a:rPr lang="en-US" dirty="0" smtClean="0"/>
+              <a:t>	</a:t>
+            </a:r>
+            <a:r>
+              <a:rPr lang="en-US" dirty="0" smtClean="0"/>
+              <a:t>					This will also have specific information about the company and they’re general entry requirements.</a:t>
+            </a:r>
           </a:p>
         </p:txBody>
       </p:sp>
     </p:spTree>
-    <p:extLst>
-      <p:ext uri="{BB962C8B-B14F-4D97-AF65-F5344CB8AC3E}">
-        <p14:creationId xmlns:p14="http://schemas.microsoft.com/office/powerpoint/2010/main" val="1426042223"/>
-      </p:ext>
-    </p:extLst>
   </p:cSld>
   <p:clrMapOvr>
     <a:masterClrMapping/>
@@ -8330,9 +8728,10 @@
           <a:lstStyle/>
           <a:p>
             <a:r>
-              <a:rPr lang="en-US" dirty="0"/>
-              <a:t>Problem Faced</a:t>
-            </a:r>
+              <a:rPr lang="en-US" dirty="0" smtClean="0"/>
+              <a:t>Upload Center</a:t>
+            </a:r>
+            <a:endParaRPr lang="en-US" dirty="0"/>
           </a:p>
         </p:txBody>
       </p:sp>
@@ -8348,37 +8747,69 @@
         </p:nvSpPr>
         <p:spPr/>
         <p:txBody>
-          <a:bodyPr>
-            <a:normAutofit/>
-          </a:bodyPr>
+          <a:bodyPr/>
           <a:lstStyle/>
           <a:p>
             <a:r>
-              <a:rPr lang="en-US" sz="2400" dirty="0" smtClean="0"/>
-              <a:t>Advertised job market</a:t>
-            </a:r>
-          </a:p>
-          <a:p>
-            <a:r>
-              <a:rPr lang="en-US" sz="2400" dirty="0" smtClean="0"/>
-              <a:t>Online advertising is down to 60% due to overwhelming number of resumes</a:t>
-            </a:r>
-          </a:p>
-          <a:p>
-            <a:r>
-              <a:rPr lang="en-US" sz="2400" dirty="0" smtClean="0"/>
-              <a:t>60-80% of the meaningful job go unadvertised </a:t>
-            </a:r>
-            <a:endParaRPr lang="en-US" sz="2400" dirty="0"/>
+              <a:rPr lang="en-US" dirty="0" smtClean="0"/>
+              <a:t>Vacancy Announcement:</a:t>
+            </a:r>
+          </a:p>
+          <a:p>
+            <a:pPr>
+              <a:buNone/>
+            </a:pPr>
+            <a:r>
+              <a:rPr lang="en-US" dirty="0" smtClean="0"/>
+              <a:t>	</a:t>
+            </a:r>
+            <a:r>
+              <a:rPr lang="en-US" dirty="0" smtClean="0"/>
+              <a:t>							</a:t>
+            </a:r>
+            <a:r>
+              <a:rPr lang="en-US" dirty="0" smtClean="0"/>
+              <a:t>This page will have all the vacancy circular posted by the job board and other industrial companies. </a:t>
+            </a:r>
+          </a:p>
+          <a:p>
+            <a:pPr>
+              <a:buNone/>
+            </a:pPr>
+            <a:endParaRPr lang="en-US" dirty="0" smtClean="0"/>
+          </a:p>
+          <a:p>
+            <a:r>
+              <a:rPr lang="en-US" dirty="0" smtClean="0"/>
+              <a:t>Apply button:</a:t>
+            </a:r>
+          </a:p>
+          <a:p>
+            <a:pPr>
+              <a:buNone/>
+            </a:pPr>
+            <a:r>
+              <a:rPr lang="en-US" dirty="0" smtClean="0"/>
+              <a:t>	</a:t>
+            </a:r>
+            <a:r>
+              <a:rPr lang="en-US" dirty="0" smtClean="0"/>
+              <a:t>				Each job circular post will have apply button at the right most end of the post .</a:t>
+            </a:r>
+          </a:p>
+          <a:p>
+            <a:pPr>
+              <a:buNone/>
+            </a:pPr>
+            <a:r>
+              <a:rPr lang="en-US" dirty="0" smtClean="0"/>
+              <a:t>								</a:t>
+            </a:r>
+            <a:endParaRPr lang="en-US" dirty="0"/>
           </a:p>
         </p:txBody>
       </p:sp>
     </p:spTree>
-    <p:extLst>
-      <p:ext uri="{BB962C8B-B14F-4D97-AF65-F5344CB8AC3E}">
-        <p14:creationId xmlns:p14="http://schemas.microsoft.com/office/powerpoint/2010/main" val="363206370"/>
-      </p:ext>
-    </p:extLst>
   </p:cSld>
   <p:clrMapOvr>
     <a:masterClrMapping/>
@@ -8420,7 +8851,7 @@
           <a:p>
             <a:r>
               <a:rPr lang="en-US" dirty="0" smtClean="0"/>
-              <a:t>Problem solving </a:t>
+              <a:t>Web app view</a:t>
             </a:r>
             <a:endParaRPr lang="en-US" dirty="0"/>
           </a:p>
@@ -8439,38 +8870,146 @@
         <p:spPr/>
         <p:txBody>
           <a:bodyPr>
-            <a:normAutofit/>
+            <a:normAutofit fontScale="62500" lnSpcReduction="20000"/>
           </a:bodyPr>
           <a:lstStyle/>
           <a:p>
             <a:r>
-              <a:rPr lang="en-US" sz="2400" dirty="0" smtClean="0"/>
-              <a:t>Our website which is online job market is the solution of those problems we discussed.</a:t>
-            </a:r>
-          </a:p>
-          <a:p>
-            <a:r>
-              <a:rPr lang="en-US" sz="2400" dirty="0" smtClean="0"/>
-              <a:t>Will provide simple User Interface(UI)</a:t>
-            </a:r>
-          </a:p>
-          <a:p>
-            <a:r>
-              <a:rPr lang="en-US" sz="2400" dirty="0" smtClean="0"/>
-              <a:t>It would be easier for them to scroll through jobs</a:t>
-            </a:r>
-          </a:p>
-          <a:p>
-            <a:endParaRPr lang="en-US" sz="2400" dirty="0"/>
+              <a:rPr lang="en-US" dirty="0" smtClean="0"/>
+              <a:t>Public  view:</a:t>
+            </a:r>
+          </a:p>
+          <a:p>
+            <a:pPr>
+              <a:buNone/>
+            </a:pPr>
+            <a:r>
+              <a:rPr lang="en-US" dirty="0" smtClean="0"/>
+              <a:t>	</a:t>
+            </a:r>
+            <a:r>
+              <a:rPr lang="en-US" dirty="0" smtClean="0"/>
+              <a:t>				This is the public page whenever anyone</a:t>
+            </a:r>
+          </a:p>
+          <a:p>
+            <a:pPr marL="400050" indent="-400050">
+              <a:buNone/>
+            </a:pPr>
+            <a:r>
+              <a:rPr lang="en-US" dirty="0" smtClean="0"/>
+              <a:t>				hits the app they will see the following options.</a:t>
+            </a:r>
+          </a:p>
+          <a:p>
+            <a:pPr marL="400050" indent="-400050">
+              <a:buNone/>
+            </a:pPr>
+            <a:r>
+              <a:rPr lang="en-US" dirty="0" smtClean="0"/>
+              <a:t>				1.Information </a:t>
+            </a:r>
+          </a:p>
+          <a:p>
+            <a:pPr marL="400050" indent="-400050">
+              <a:buNone/>
+            </a:pPr>
+            <a:r>
+              <a:rPr lang="en-US" dirty="0" smtClean="0"/>
+              <a:t>				2.FAQ </a:t>
+            </a:r>
+          </a:p>
+          <a:p>
+            <a:pPr marL="400050" indent="-400050">
+              <a:buNone/>
+            </a:pPr>
+            <a:r>
+              <a:rPr lang="en-US" dirty="0" smtClean="0"/>
+              <a:t>				3Log in </a:t>
+            </a:r>
+          </a:p>
+          <a:p>
+            <a:pPr marL="400050" indent="-400050">
+              <a:buNone/>
+            </a:pPr>
+            <a:r>
+              <a:rPr lang="en-US" dirty="0" smtClean="0"/>
+              <a:t> 				4.Register</a:t>
+            </a:r>
+          </a:p>
+          <a:p>
+            <a:r>
+              <a:rPr lang="en-US" dirty="0" smtClean="0"/>
+              <a:t>Candidate view:</a:t>
+            </a:r>
+          </a:p>
+          <a:p>
+            <a:pPr>
+              <a:buNone/>
+            </a:pPr>
+            <a:r>
+              <a:rPr lang="en-US" dirty="0" smtClean="0"/>
+              <a:t>	</a:t>
+            </a:r>
+            <a:r>
+              <a:rPr lang="en-US" dirty="0" smtClean="0"/>
+              <a:t>					Candidates will see the following options. </a:t>
+            </a:r>
+          </a:p>
+          <a:p>
+            <a:pPr>
+              <a:buAutoNum type="arabicPeriod"/>
+            </a:pPr>
+            <a:r>
+              <a:rPr lang="en-US" dirty="0" smtClean="0"/>
+              <a:t>Vacancy announcement </a:t>
+            </a:r>
+          </a:p>
+          <a:p>
+            <a:pPr>
+              <a:buAutoNum type="arabicPeriod"/>
+            </a:pPr>
+            <a:r>
+              <a:rPr lang="en-US" dirty="0" smtClean="0"/>
+              <a:t>2.CV upload </a:t>
+            </a:r>
+          </a:p>
+          <a:p>
+            <a:pPr>
+              <a:buAutoNum type="arabicPeriod"/>
+            </a:pPr>
+            <a:r>
+              <a:rPr lang="en-US" dirty="0" smtClean="0"/>
+              <a:t>3. Messages</a:t>
+            </a:r>
+          </a:p>
+          <a:p>
+            <a:r>
+              <a:rPr lang="en-US" dirty="0" smtClean="0"/>
+              <a:t>Job board view: </a:t>
+            </a:r>
+          </a:p>
+          <a:p>
+            <a:pPr>
+              <a:buNone/>
+            </a:pPr>
+            <a:r>
+              <a:rPr lang="en-US" dirty="0" smtClean="0"/>
+              <a:t>	</a:t>
+            </a:r>
+            <a:r>
+              <a:rPr lang="en-US" dirty="0" smtClean="0"/>
+              <a:t>			The job board will be able to upload job post and get CV also they will able see the general profile of </a:t>
+            </a:r>
+            <a:r>
+              <a:rPr lang="en-US" smtClean="0"/>
+              <a:t>the candidate.</a:t>
+            </a:r>
+            <a:endParaRPr lang="en-US" dirty="0"/>
           </a:p>
         </p:txBody>
       </p:sp>
     </p:spTree>
-    <p:extLst>
-      <p:ext uri="{BB962C8B-B14F-4D97-AF65-F5344CB8AC3E}">
-        <p14:creationId xmlns:p14="http://schemas.microsoft.com/office/powerpoint/2010/main" val="2832233067"/>
-      </p:ext>
-    </p:extLst>
   </p:cSld>
   <p:clrMapOvr>
     <a:masterClrMapping/>
@@ -8512,7 +9051,7 @@
           <a:p>
             <a:r>
               <a:rPr lang="en-US" dirty="0" smtClean="0"/>
-              <a:t>Real Life achievements </a:t>
+              <a:t>Description</a:t>
             </a:r>
             <a:endParaRPr lang="en-US" dirty="0"/>
           </a:p>
@@ -8537,25 +9076,20 @@
           <a:p>
             <a:r>
               <a:rPr lang="en-US" sz="2400" dirty="0" smtClean="0"/>
-              <a:t>People will get their desired jobs by sitting at home</a:t>
+              <a:t>It will be an online based website where people can browse through the newsfeed to look into their desired jobs.</a:t>
             </a:r>
           </a:p>
           <a:p>
             <a:r>
               <a:rPr lang="en-US" sz="2400" dirty="0" smtClean="0"/>
-              <a:t>We can earn money by running adds </a:t>
+              <a:t>We will try to connect all the companies so that there will be a variety types of jobs available.</a:t>
             </a:r>
           </a:p>
           <a:p>
             <a:r>
               <a:rPr lang="en-US" sz="2400" dirty="0" smtClean="0"/>
-              <a:t>will decrease the unemployment rate</a:t>
-            </a:r>
-          </a:p>
-          <a:p>
-            <a:endParaRPr lang="en-US" sz="2400" dirty="0" smtClean="0"/>
-          </a:p>
-          <a:p>
+              <a:t>It will offer jobs like IT , Corporate , Teaching and other variety jobs in private sectors.</a:t>
+            </a:r>
             <a:endParaRPr lang="en-US" sz="2400" dirty="0"/>
           </a:p>
         </p:txBody>
@@ -8563,7 +9097,7 @@
     </p:spTree>
     <p:extLst>
       <p:ext uri="{BB962C8B-B14F-4D97-AF65-F5344CB8AC3E}">
-        <p14:creationId xmlns:p14="http://schemas.microsoft.com/office/powerpoint/2010/main" val="3306693991"/>
+        <p14:creationId xmlns:p14="http://schemas.microsoft.com/office/powerpoint/2010/main" xmlns="" val="2162233371"/>
       </p:ext>
     </p:extLst>
   </p:cSld>
@@ -8607,7 +9141,7 @@
           <a:p>
             <a:r>
               <a:rPr lang="en-US" dirty="0" smtClean="0"/>
-              <a:t>Technology Used</a:t>
+              <a:t>Problem Faced</a:t>
             </a:r>
             <a:endParaRPr lang="en-US" dirty="0"/>
           </a:p>
@@ -8626,67 +9160,56 @@
         <p:spPr/>
         <p:txBody>
           <a:bodyPr>
-            <a:normAutofit/>
+            <a:normAutofit fontScale="92500"/>
           </a:bodyPr>
           <a:lstStyle/>
           <a:p>
-            <a:pPr marL="0" indent="0">
-              <a:buNone/>
-            </a:pPr>
-            <a:r>
-              <a:rPr lang="en-US" sz="2800" dirty="0" smtClean="0"/>
-              <a:t>  </a:t>
-            </a:r>
-            <a:r>
-              <a:rPr lang="en-US" sz="2800" b="1" dirty="0" smtClean="0"/>
-              <a:t>Backend :</a:t>
-            </a:r>
-          </a:p>
-          <a:p>
-            <a:pPr marL="0" indent="0">
-              <a:buNone/>
-            </a:pPr>
-            <a:endParaRPr lang="en-US" sz="2800" b="1" dirty="0" smtClean="0"/>
-          </a:p>
-          <a:p>
-            <a:pPr marL="0" indent="0">
-              <a:buNone/>
-            </a:pPr>
-            <a:r>
-              <a:rPr lang="en-US" sz="2800" b="1" dirty="0" smtClean="0"/>
-              <a:t>Framework - </a:t>
-            </a:r>
-            <a:r>
-              <a:rPr lang="en-US" sz="2800" b="1" dirty="0" err="1" smtClean="0"/>
-              <a:t>Laravel</a:t>
-            </a:r>
-            <a:endParaRPr lang="en-US" sz="2800" b="1" dirty="0" smtClean="0"/>
-          </a:p>
-          <a:p>
-            <a:pPr marL="0" indent="0">
-              <a:buNone/>
-            </a:pPr>
-            <a:r>
-              <a:rPr lang="en-US" sz="2800" b="1" dirty="0" smtClean="0"/>
-              <a:t>Language - PHP</a:t>
-            </a:r>
-          </a:p>
-          <a:p>
-            <a:pPr marL="0" indent="0">
-              <a:buNone/>
-            </a:pPr>
-            <a:r>
-              <a:rPr lang="en-US" sz="2800" b="1" dirty="0" smtClean="0"/>
-              <a:t>Database - MySQL</a:t>
-            </a:r>
-            <a:endParaRPr lang="en-US" sz="2800" b="1" dirty="0"/>
+            <a:r>
+              <a:rPr lang="en-US" sz="2400" dirty="0" smtClean="0"/>
+              <a:t>Finding a job is one of the biggest problem</a:t>
+            </a:r>
+          </a:p>
+          <a:p>
+            <a:r>
+              <a:rPr lang="en-US" sz="2400" dirty="0" smtClean="0"/>
+              <a:t>Unemployment rate is increasing day by day</a:t>
+            </a:r>
+          </a:p>
+          <a:p>
+            <a:r>
+              <a:rPr lang="en-US" sz="2400" dirty="0" smtClean="0"/>
+              <a:t>There is very few online job websites in our country</a:t>
+            </a:r>
+          </a:p>
+          <a:p>
+            <a:r>
+              <a:rPr lang="en-US" sz="2400" dirty="0" smtClean="0"/>
+              <a:t>Other websites also don</a:t>
+            </a:r>
+            <a:r>
+              <a:rPr lang="mr-IN" sz="2400" dirty="0" smtClean="0"/>
+              <a:t>’</a:t>
+            </a:r>
+            <a:r>
+              <a:rPr lang="en-US" sz="2400" dirty="0" smtClean="0"/>
+              <a:t>t work well. Noticeable bugs in them . No one to fix</a:t>
+            </a:r>
+          </a:p>
+          <a:p>
+            <a:r>
+              <a:rPr lang="en-US" sz="2400" dirty="0" smtClean="0"/>
+              <a:t>Complex user interface(UI) for mass people.</a:t>
+            </a:r>
+          </a:p>
+          <a:p>
+            <a:endParaRPr lang="en-US" sz="2400" dirty="0"/>
           </a:p>
         </p:txBody>
       </p:sp>
     </p:spTree>
     <p:extLst>
       <p:ext uri="{BB962C8B-B14F-4D97-AF65-F5344CB8AC3E}">
-        <p14:creationId xmlns:p14="http://schemas.microsoft.com/office/powerpoint/2010/main" val="1830609776"/>
+        <p14:creationId xmlns:p14="http://schemas.microsoft.com/office/powerpoint/2010/main" xmlns="" val="1426042223"/>
       </p:ext>
     </p:extLst>
   </p:cSld>
@@ -8730,7 +9253,7 @@
           <a:p>
             <a:r>
               <a:rPr lang="en-US" dirty="0"/>
-              <a:t>Technology Used</a:t>
+              <a:t>Problem Faced</a:t>
             </a:r>
           </a:p>
         </p:txBody>
@@ -8752,68 +9275,122 @@
           </a:bodyPr>
           <a:lstStyle/>
           <a:p>
-            <a:pPr marL="0" indent="0">
-              <a:buNone/>
-            </a:pPr>
-            <a:r>
-              <a:rPr lang="en-US" sz="2800" dirty="0"/>
-              <a:t> </a:t>
-            </a:r>
-            <a:r>
-              <a:rPr lang="en-US" sz="2800" dirty="0" smtClean="0"/>
-              <a:t>  </a:t>
-            </a:r>
-            <a:r>
-              <a:rPr lang="en-US" sz="2800" b="1" dirty="0" smtClean="0"/>
-              <a:t>Front End:</a:t>
-            </a:r>
-          </a:p>
-          <a:p>
-            <a:pPr marL="0" indent="0">
-              <a:buNone/>
-            </a:pPr>
-            <a:endParaRPr lang="en-US" sz="2800" b="1" dirty="0"/>
-          </a:p>
-          <a:p>
-            <a:pPr marL="0" indent="0">
-              <a:buNone/>
-            </a:pPr>
-            <a:r>
-              <a:rPr lang="en-US" sz="2800" b="1" dirty="0" smtClean="0"/>
-              <a:t>Framework </a:t>
-            </a:r>
-            <a:r>
-              <a:rPr lang="mr-IN" sz="2800" b="1" dirty="0" smtClean="0"/>
-              <a:t>–</a:t>
-            </a:r>
-            <a:r>
-              <a:rPr lang="en-US" sz="2800" b="1" dirty="0" smtClean="0"/>
-              <a:t> Bootstrap</a:t>
-            </a:r>
-          </a:p>
-          <a:p>
-            <a:pPr marL="0" indent="0">
-              <a:buNone/>
-            </a:pPr>
-            <a:r>
-              <a:rPr lang="en-US" sz="2800" b="1" dirty="0" smtClean="0"/>
-              <a:t>Language </a:t>
-            </a:r>
-            <a:r>
-              <a:rPr lang="mr-IN" sz="2800" b="1" dirty="0" smtClean="0"/>
-              <a:t>–</a:t>
-            </a:r>
-            <a:r>
-              <a:rPr lang="en-US" sz="2800" b="1" dirty="0" smtClean="0"/>
-              <a:t> JavaScript ,CSS</a:t>
-            </a:r>
+            <a:r>
+              <a:rPr lang="en-US" sz="2400" dirty="0" smtClean="0"/>
+              <a:t>Advertised job market</a:t>
+            </a:r>
+          </a:p>
+          <a:p>
+            <a:r>
+              <a:rPr lang="en-US" sz="2400" dirty="0" smtClean="0"/>
+              <a:t>Online advertising is down to 60% due to overwhelming number of resumes</a:t>
+            </a:r>
+          </a:p>
+          <a:p>
+            <a:r>
+              <a:rPr lang="en-US" sz="2400" dirty="0" smtClean="0"/>
+              <a:t>60-80% of the meaningful job go unadvertised </a:t>
+            </a:r>
+            <a:endParaRPr lang="en-US" sz="2400" dirty="0"/>
           </a:p>
         </p:txBody>
       </p:sp>
     </p:spTree>
     <p:extLst>
       <p:ext uri="{BB962C8B-B14F-4D97-AF65-F5344CB8AC3E}">
-        <p14:creationId xmlns:p14="http://schemas.microsoft.com/office/powerpoint/2010/main" val="3631553748"/>
+        <p14:creationId xmlns:p14="http://schemas.microsoft.com/office/powerpoint/2010/main" xmlns="" val="363206370"/>
+      </p:ext>
+    </p:extLst>
+  </p:cSld>
+  <p:clrMapOvr>
+    <a:masterClrMapping/>
+  </p:clrMapOvr>
+</p:sld>
+</file>
+
+<file path=ppt/slides/slide9.xml><?xml version="1.0" encoding="utf-8"?>
+<p:sld xmlns:a="http://schemas.openxmlformats.org/drawingml/2006/main" xmlns:r="http://schemas.openxmlformats.org/officeDocument/2006/relationships" xmlns:p="http://schemas.openxmlformats.org/presentationml/2006/main">
+  <p:cSld>
+    <p:spTree>
+      <p:nvGrpSpPr>
+        <p:cNvPr id="1" name=""/>
+        <p:cNvGrpSpPr/>
+        <p:nvPr/>
+      </p:nvGrpSpPr>
+      <p:grpSpPr>
+        <a:xfrm>
+          <a:off x="0" y="0"/>
+          <a:ext cx="0" cy="0"/>
+          <a:chOff x="0" y="0"/>
+          <a:chExt cx="0" cy="0"/>
+        </a:xfrm>
+      </p:grpSpPr>
+      <p:sp>
+        <p:nvSpPr>
+          <p:cNvPr id="2" name="Title 1"/>
+          <p:cNvSpPr>
+            <a:spLocks noGrp="1"/>
+          </p:cNvSpPr>
+          <p:nvPr>
+            <p:ph type="title"/>
+          </p:nvPr>
+        </p:nvSpPr>
+        <p:spPr/>
+        <p:txBody>
+          <a:bodyPr/>
+          <a:lstStyle/>
+          <a:p>
+            <a:r>
+              <a:rPr lang="en-US" dirty="0" smtClean="0"/>
+              <a:t>Problem solving </a:t>
+            </a:r>
+            <a:endParaRPr lang="en-US" dirty="0"/>
+          </a:p>
+        </p:txBody>
+      </p:sp>
+      <p:sp>
+        <p:nvSpPr>
+          <p:cNvPr id="3" name="Content Placeholder 2"/>
+          <p:cNvSpPr>
+            <a:spLocks noGrp="1"/>
+          </p:cNvSpPr>
+          <p:nvPr>
+            <p:ph idx="1"/>
+          </p:nvPr>
+        </p:nvSpPr>
+        <p:spPr/>
+        <p:txBody>
+          <a:bodyPr>
+            <a:normAutofit/>
+          </a:bodyPr>
+          <a:lstStyle/>
+          <a:p>
+            <a:r>
+              <a:rPr lang="en-US" sz="2400" dirty="0" smtClean="0"/>
+              <a:t>Our website which is online job market is the solution of those problems we discussed.</a:t>
+            </a:r>
+          </a:p>
+          <a:p>
+            <a:r>
+              <a:rPr lang="en-US" sz="2400" dirty="0" smtClean="0"/>
+              <a:t>Will provide simple User Interface(UI)</a:t>
+            </a:r>
+          </a:p>
+          <a:p>
+            <a:r>
+              <a:rPr lang="en-US" sz="2400" dirty="0" smtClean="0"/>
+              <a:t>It would be easier for them to scroll through jobs</a:t>
+            </a:r>
+          </a:p>
+          <a:p>
+            <a:endParaRPr lang="en-US" sz="2400" dirty="0"/>
+          </a:p>
+        </p:txBody>
+      </p:sp>
+    </p:spTree>
+    <p:extLst>
+      <p:ext uri="{BB962C8B-B14F-4D97-AF65-F5344CB8AC3E}">
+        <p14:creationId xmlns:p14="http://schemas.microsoft.com/office/powerpoint/2010/main" xmlns="" val="2832233067"/>
       </p:ext>
     </p:extLst>
   </p:cSld>
@@ -9060,7 +9637,7 @@
   <a:extraClrSchemeLst/>
   <a:extLst>
     <a:ext uri="{05A4C25C-085E-4340-85A3-A5531E510DB2}">
-      <thm15:themeFamily xmlns:thm15="http://schemas.microsoft.com/office/thememl/2012/main" xmlns="" name="Wisp" id="{7CB32D59-10C0-40DD-B7BD-2E94284A981C}" vid="{24B1A44C-C006-48B2-A4D7-E5549B3D8CD4}"/>
+      <thm15:themeFamily xmlns="" xmlns:thm15="http://schemas.microsoft.com/office/thememl/2012/main" name="Wisp" id="{7CB32D59-10C0-40DD-B7BD-2E94284A981C}" vid="{24B1A44C-C006-48B2-A4D7-E5549B3D8CD4}"/>
     </a:ext>
   </a:extLst>
 </a:theme>

</xml_diff>